<commit_message>
created chloropleth and updated ppt
</commit_message>
<xml_diff>
--- a/Nashville Businesses in Black Communities.pptx
+++ b/Nashville Businesses in Black Communities.pptx
@@ -4,11 +4,16 @@
   <p:sldMasterIdLst>
     <p:sldMasterId id="2147483775" r:id="rId1"/>
   </p:sldMasterIdLst>
+  <p:notesMasterIdLst>
+    <p:notesMasterId r:id="rId8"/>
+  </p:notesMasterIdLst>
   <p:sldIdLst>
     <p:sldId id="256" r:id="rId2"/>
     <p:sldId id="257" r:id="rId3"/>
     <p:sldId id="258" r:id="rId4"/>
     <p:sldId id="259" r:id="rId5"/>
+    <p:sldId id="260" r:id="rId6"/>
+    <p:sldId id="261" r:id="rId7"/>
   </p:sldIdLst>
   <p:sldSz cx="12192000" cy="6858000"/>
   <p:notesSz cx="6858000" cy="9144000"/>
@@ -107,7 +112,451 @@
       </a:defRPr>
     </a:lvl9pPr>
   </p:defaultTextStyle>
+  <p:extLst>
+    <p:ext uri="{EFAFB233-063F-42B5-8137-9DF3F51BA10A}">
+      <p15:sldGuideLst xmlns:p15="http://schemas.microsoft.com/office/powerpoint/2012/main"/>
+    </p:ext>
+    <p:ext uri="{2D200454-40CA-4A62-9FC3-DE9A4176ACB9}">
+      <p15:notesGuideLst xmlns:p15="http://schemas.microsoft.com/office/powerpoint/2012/main"/>
+    </p:ext>
+  </p:extLst>
 </p:presentation>
+</file>
+
+<file path=ppt/notesMasters/notesMaster1.xml><?xml version="1.0" encoding="utf-8"?>
+<p:notesMaster xmlns:a="http://schemas.openxmlformats.org/drawingml/2006/main" xmlns:r="http://schemas.openxmlformats.org/officeDocument/2006/relationships" xmlns:p="http://schemas.openxmlformats.org/presentationml/2006/main">
+  <p:cSld>
+    <p:bg>
+      <p:bgRef idx="1001">
+        <a:schemeClr val="bg1"/>
+      </p:bgRef>
+    </p:bg>
+    <p:spTree>
+      <p:nvGrpSpPr>
+        <p:cNvPr id="1" name=""/>
+        <p:cNvGrpSpPr/>
+        <p:nvPr/>
+      </p:nvGrpSpPr>
+      <p:grpSpPr>
+        <a:xfrm>
+          <a:off x="0" y="0"/>
+          <a:ext cx="0" cy="0"/>
+          <a:chOff x="0" y="0"/>
+          <a:chExt cx="0" cy="0"/>
+        </a:xfrm>
+      </p:grpSpPr>
+      <p:sp>
+        <p:nvSpPr>
+          <p:cNvPr id="2" name="Header Placeholder 1"/>
+          <p:cNvSpPr>
+            <a:spLocks noGrp="1"/>
+          </p:cNvSpPr>
+          <p:nvPr>
+            <p:ph type="hdr" sz="quarter"/>
+          </p:nvPr>
+        </p:nvSpPr>
+        <p:spPr>
+          <a:xfrm>
+            <a:off x="0" y="0"/>
+            <a:ext cx="2971800" cy="458788"/>
+          </a:xfrm>
+          <a:prstGeom prst="rect">
+            <a:avLst/>
+          </a:prstGeom>
+        </p:spPr>
+        <p:txBody>
+          <a:bodyPr vert="horz" lIns="91440" tIns="45720" rIns="91440" bIns="45720" rtlCol="0"/>
+          <a:lstStyle>
+            <a:lvl1pPr algn="l">
+              <a:defRPr sz="1200"/>
+            </a:lvl1pPr>
+          </a:lstStyle>
+          <a:p>
+            <a:endParaRPr lang="en-US"/>
+          </a:p>
+        </p:txBody>
+      </p:sp>
+      <p:sp>
+        <p:nvSpPr>
+          <p:cNvPr id="3" name="Date Placeholder 2"/>
+          <p:cNvSpPr>
+            <a:spLocks noGrp="1"/>
+          </p:cNvSpPr>
+          <p:nvPr>
+            <p:ph type="dt" idx="1"/>
+          </p:nvPr>
+        </p:nvSpPr>
+        <p:spPr>
+          <a:xfrm>
+            <a:off x="3884613" y="0"/>
+            <a:ext cx="2971800" cy="458788"/>
+          </a:xfrm>
+          <a:prstGeom prst="rect">
+            <a:avLst/>
+          </a:prstGeom>
+        </p:spPr>
+        <p:txBody>
+          <a:bodyPr vert="horz" lIns="91440" tIns="45720" rIns="91440" bIns="45720" rtlCol="0"/>
+          <a:lstStyle>
+            <a:lvl1pPr algn="r">
+              <a:defRPr sz="1200"/>
+            </a:lvl1pPr>
+          </a:lstStyle>
+          <a:p>
+            <a:fld id="{24B3DC48-D807-4CB8-8AC2-9634B3593D1F}" type="datetimeFigureOut">
+              <a:rPr lang="en-US" smtClean="0"/>
+              <a:t>12/19/2021</a:t>
+            </a:fld>
+            <a:endParaRPr lang="en-US"/>
+          </a:p>
+        </p:txBody>
+      </p:sp>
+      <p:sp>
+        <p:nvSpPr>
+          <p:cNvPr id="4" name="Slide Image Placeholder 3"/>
+          <p:cNvSpPr>
+            <a:spLocks noGrp="1" noRot="1" noChangeAspect="1"/>
+          </p:cNvSpPr>
+          <p:nvPr>
+            <p:ph type="sldImg" idx="2"/>
+          </p:nvPr>
+        </p:nvSpPr>
+        <p:spPr>
+          <a:xfrm>
+            <a:off x="685800" y="1143000"/>
+            <a:ext cx="5486400" cy="3086100"/>
+          </a:xfrm>
+          <a:prstGeom prst="rect">
+            <a:avLst/>
+          </a:prstGeom>
+          <a:noFill/>
+          <a:ln w="12700">
+            <a:solidFill>
+              <a:prstClr val="black"/>
+            </a:solidFill>
+          </a:ln>
+        </p:spPr>
+        <p:txBody>
+          <a:bodyPr vert="horz" lIns="91440" tIns="45720" rIns="91440" bIns="45720" rtlCol="0" anchor="ctr"/>
+          <a:lstStyle/>
+          <a:p>
+            <a:endParaRPr lang="en-US"/>
+          </a:p>
+        </p:txBody>
+      </p:sp>
+      <p:sp>
+        <p:nvSpPr>
+          <p:cNvPr id="5" name="Notes Placeholder 4"/>
+          <p:cNvSpPr>
+            <a:spLocks noGrp="1"/>
+          </p:cNvSpPr>
+          <p:nvPr>
+            <p:ph type="body" sz="quarter" idx="3"/>
+          </p:nvPr>
+        </p:nvSpPr>
+        <p:spPr>
+          <a:xfrm>
+            <a:off x="685800" y="4400550"/>
+            <a:ext cx="5486400" cy="3600450"/>
+          </a:xfrm>
+          <a:prstGeom prst="rect">
+            <a:avLst/>
+          </a:prstGeom>
+        </p:spPr>
+        <p:txBody>
+          <a:bodyPr vert="horz" lIns="91440" tIns="45720" rIns="91440" bIns="45720" rtlCol="0"/>
+          <a:lstStyle/>
+          <a:p>
+            <a:pPr lvl="0"/>
+            <a:r>
+              <a:rPr lang="en-US"/>
+              <a:t>Click to edit Master text styles</a:t>
+            </a:r>
+          </a:p>
+          <a:p>
+            <a:pPr lvl="1"/>
+            <a:r>
+              <a:rPr lang="en-US"/>
+              <a:t>Second level</a:t>
+            </a:r>
+          </a:p>
+          <a:p>
+            <a:pPr lvl="2"/>
+            <a:r>
+              <a:rPr lang="en-US"/>
+              <a:t>Third level</a:t>
+            </a:r>
+          </a:p>
+          <a:p>
+            <a:pPr lvl="3"/>
+            <a:r>
+              <a:rPr lang="en-US"/>
+              <a:t>Fourth level</a:t>
+            </a:r>
+          </a:p>
+          <a:p>
+            <a:pPr lvl="4"/>
+            <a:r>
+              <a:rPr lang="en-US"/>
+              <a:t>Fifth level</a:t>
+            </a:r>
+          </a:p>
+        </p:txBody>
+      </p:sp>
+      <p:sp>
+        <p:nvSpPr>
+          <p:cNvPr id="6" name="Footer Placeholder 5"/>
+          <p:cNvSpPr>
+            <a:spLocks noGrp="1"/>
+          </p:cNvSpPr>
+          <p:nvPr>
+            <p:ph type="ftr" sz="quarter" idx="4"/>
+          </p:nvPr>
+        </p:nvSpPr>
+        <p:spPr>
+          <a:xfrm>
+            <a:off x="0" y="8685213"/>
+            <a:ext cx="2971800" cy="458787"/>
+          </a:xfrm>
+          <a:prstGeom prst="rect">
+            <a:avLst/>
+          </a:prstGeom>
+        </p:spPr>
+        <p:txBody>
+          <a:bodyPr vert="horz" lIns="91440" tIns="45720" rIns="91440" bIns="45720" rtlCol="0" anchor="b"/>
+          <a:lstStyle>
+            <a:lvl1pPr algn="l">
+              <a:defRPr sz="1200"/>
+            </a:lvl1pPr>
+          </a:lstStyle>
+          <a:p>
+            <a:endParaRPr lang="en-US"/>
+          </a:p>
+        </p:txBody>
+      </p:sp>
+      <p:sp>
+        <p:nvSpPr>
+          <p:cNvPr id="7" name="Slide Number Placeholder 6"/>
+          <p:cNvSpPr>
+            <a:spLocks noGrp="1"/>
+          </p:cNvSpPr>
+          <p:nvPr>
+            <p:ph type="sldNum" sz="quarter" idx="5"/>
+          </p:nvPr>
+        </p:nvSpPr>
+        <p:spPr>
+          <a:xfrm>
+            <a:off x="3884613" y="8685213"/>
+            <a:ext cx="2971800" cy="458787"/>
+          </a:xfrm>
+          <a:prstGeom prst="rect">
+            <a:avLst/>
+          </a:prstGeom>
+        </p:spPr>
+        <p:txBody>
+          <a:bodyPr vert="horz" lIns="91440" tIns="45720" rIns="91440" bIns="45720" rtlCol="0" anchor="b"/>
+          <a:lstStyle>
+            <a:lvl1pPr algn="r">
+              <a:defRPr sz="1200"/>
+            </a:lvl1pPr>
+          </a:lstStyle>
+          <a:p>
+            <a:fld id="{1C1ED85E-C528-4A4A-84D2-C4CB41DC396C}" type="slidenum">
+              <a:rPr lang="en-US" smtClean="0"/>
+              <a:t>‹#›</a:t>
+            </a:fld>
+            <a:endParaRPr lang="en-US"/>
+          </a:p>
+        </p:txBody>
+      </p:sp>
+    </p:spTree>
+    <p:extLst>
+      <p:ext uri="{BB962C8B-B14F-4D97-AF65-F5344CB8AC3E}">
+        <p14:creationId xmlns:p14="http://schemas.microsoft.com/office/powerpoint/2010/main" val="1982889682"/>
+      </p:ext>
+    </p:extLst>
+  </p:cSld>
+  <p:clrMap bg1="lt1" tx1="dk1" bg2="lt2" tx2="dk2" accent1="accent1" accent2="accent2" accent3="accent3" accent4="accent4" accent5="accent5" accent6="accent6" hlink="hlink" folHlink="folHlink"/>
+  <p:notesStyle>
+    <a:lvl1pPr marL="0" algn="l" defTabSz="914400" rtl="0" eaLnBrk="1" latinLnBrk="0" hangingPunct="1">
+      <a:defRPr sz="1200" kern="1200">
+        <a:solidFill>
+          <a:schemeClr val="tx1"/>
+        </a:solidFill>
+        <a:latin typeface="+mn-lt"/>
+        <a:ea typeface="+mn-ea"/>
+        <a:cs typeface="+mn-cs"/>
+      </a:defRPr>
+    </a:lvl1pPr>
+    <a:lvl2pPr marL="457200" algn="l" defTabSz="914400" rtl="0" eaLnBrk="1" latinLnBrk="0" hangingPunct="1">
+      <a:defRPr sz="1200" kern="1200">
+        <a:solidFill>
+          <a:schemeClr val="tx1"/>
+        </a:solidFill>
+        <a:latin typeface="+mn-lt"/>
+        <a:ea typeface="+mn-ea"/>
+        <a:cs typeface="+mn-cs"/>
+      </a:defRPr>
+    </a:lvl2pPr>
+    <a:lvl3pPr marL="914400" algn="l" defTabSz="914400" rtl="0" eaLnBrk="1" latinLnBrk="0" hangingPunct="1">
+      <a:defRPr sz="1200" kern="1200">
+        <a:solidFill>
+          <a:schemeClr val="tx1"/>
+        </a:solidFill>
+        <a:latin typeface="+mn-lt"/>
+        <a:ea typeface="+mn-ea"/>
+        <a:cs typeface="+mn-cs"/>
+      </a:defRPr>
+    </a:lvl3pPr>
+    <a:lvl4pPr marL="1371600" algn="l" defTabSz="914400" rtl="0" eaLnBrk="1" latinLnBrk="0" hangingPunct="1">
+      <a:defRPr sz="1200" kern="1200">
+        <a:solidFill>
+          <a:schemeClr val="tx1"/>
+        </a:solidFill>
+        <a:latin typeface="+mn-lt"/>
+        <a:ea typeface="+mn-ea"/>
+        <a:cs typeface="+mn-cs"/>
+      </a:defRPr>
+    </a:lvl4pPr>
+    <a:lvl5pPr marL="1828800" algn="l" defTabSz="914400" rtl="0" eaLnBrk="1" latinLnBrk="0" hangingPunct="1">
+      <a:defRPr sz="1200" kern="1200">
+        <a:solidFill>
+          <a:schemeClr val="tx1"/>
+        </a:solidFill>
+        <a:latin typeface="+mn-lt"/>
+        <a:ea typeface="+mn-ea"/>
+        <a:cs typeface="+mn-cs"/>
+      </a:defRPr>
+    </a:lvl5pPr>
+    <a:lvl6pPr marL="2286000" algn="l" defTabSz="914400" rtl="0" eaLnBrk="1" latinLnBrk="0" hangingPunct="1">
+      <a:defRPr sz="1200" kern="1200">
+        <a:solidFill>
+          <a:schemeClr val="tx1"/>
+        </a:solidFill>
+        <a:latin typeface="+mn-lt"/>
+        <a:ea typeface="+mn-ea"/>
+        <a:cs typeface="+mn-cs"/>
+      </a:defRPr>
+    </a:lvl6pPr>
+    <a:lvl7pPr marL="2743200" algn="l" defTabSz="914400" rtl="0" eaLnBrk="1" latinLnBrk="0" hangingPunct="1">
+      <a:defRPr sz="1200" kern="1200">
+        <a:solidFill>
+          <a:schemeClr val="tx1"/>
+        </a:solidFill>
+        <a:latin typeface="+mn-lt"/>
+        <a:ea typeface="+mn-ea"/>
+        <a:cs typeface="+mn-cs"/>
+      </a:defRPr>
+    </a:lvl7pPr>
+    <a:lvl8pPr marL="3200400" algn="l" defTabSz="914400" rtl="0" eaLnBrk="1" latinLnBrk="0" hangingPunct="1">
+      <a:defRPr sz="1200" kern="1200">
+        <a:solidFill>
+          <a:schemeClr val="tx1"/>
+        </a:solidFill>
+        <a:latin typeface="+mn-lt"/>
+        <a:ea typeface="+mn-ea"/>
+        <a:cs typeface="+mn-cs"/>
+      </a:defRPr>
+    </a:lvl8pPr>
+    <a:lvl9pPr marL="3657600" algn="l" defTabSz="914400" rtl="0" eaLnBrk="1" latinLnBrk="0" hangingPunct="1">
+      <a:defRPr sz="1200" kern="1200">
+        <a:solidFill>
+          <a:schemeClr val="tx1"/>
+        </a:solidFill>
+        <a:latin typeface="+mn-lt"/>
+        <a:ea typeface="+mn-ea"/>
+        <a:cs typeface="+mn-cs"/>
+      </a:defRPr>
+    </a:lvl9pPr>
+  </p:notesStyle>
+</p:notesMaster>
+</file>
+
+<file path=ppt/notesSlides/notesSlide1.xml><?xml version="1.0" encoding="utf-8"?>
+<p:notes xmlns:a="http://schemas.openxmlformats.org/drawingml/2006/main" xmlns:r="http://schemas.openxmlformats.org/officeDocument/2006/relationships" xmlns:p="http://schemas.openxmlformats.org/presentationml/2006/main">
+  <p:cSld>
+    <p:spTree>
+      <p:nvGrpSpPr>
+        <p:cNvPr id="1" name=""/>
+        <p:cNvGrpSpPr/>
+        <p:nvPr/>
+      </p:nvGrpSpPr>
+      <p:grpSpPr>
+        <a:xfrm>
+          <a:off x="0" y="0"/>
+          <a:ext cx="0" cy="0"/>
+          <a:chOff x="0" y="0"/>
+          <a:chExt cx="0" cy="0"/>
+        </a:xfrm>
+      </p:grpSpPr>
+      <p:sp>
+        <p:nvSpPr>
+          <p:cNvPr id="2" name="Slide Image Placeholder 1"/>
+          <p:cNvSpPr>
+            <a:spLocks noGrp="1" noRot="1" noChangeAspect="1"/>
+          </p:cNvSpPr>
+          <p:nvPr>
+            <p:ph type="sldImg"/>
+          </p:nvPr>
+        </p:nvSpPr>
+        <p:spPr/>
+      </p:sp>
+      <p:sp>
+        <p:nvSpPr>
+          <p:cNvPr id="3" name="Notes Placeholder 2"/>
+          <p:cNvSpPr>
+            <a:spLocks noGrp="1"/>
+          </p:cNvSpPr>
+          <p:nvPr>
+            <p:ph type="body" idx="1"/>
+          </p:nvPr>
+        </p:nvSpPr>
+        <p:spPr/>
+        <p:txBody>
+          <a:bodyPr/>
+          <a:lstStyle/>
+          <a:p>
+            <a:r>
+              <a:rPr lang="en-US" dirty="0"/>
+              <a:t>According to the New York Times, covid times have seen an increase in entrepreneurship and people going into business for themselves. This has largely been due to  </a:t>
+            </a:r>
+          </a:p>
+        </p:txBody>
+      </p:sp>
+      <p:sp>
+        <p:nvSpPr>
+          <p:cNvPr id="4" name="Slide Number Placeholder 3"/>
+          <p:cNvSpPr>
+            <a:spLocks noGrp="1"/>
+          </p:cNvSpPr>
+          <p:nvPr>
+            <p:ph type="sldNum" sz="quarter" idx="5"/>
+          </p:nvPr>
+        </p:nvSpPr>
+        <p:spPr/>
+        <p:txBody>
+          <a:bodyPr/>
+          <a:lstStyle/>
+          <a:p>
+            <a:fld id="{1C1ED85E-C528-4A4A-84D2-C4CB41DC396C}" type="slidenum">
+              <a:rPr lang="en-US" smtClean="0"/>
+              <a:t>2</a:t>
+            </a:fld>
+            <a:endParaRPr lang="en-US"/>
+          </a:p>
+        </p:txBody>
+      </p:sp>
+    </p:spTree>
+    <p:extLst>
+      <p:ext uri="{BB962C8B-B14F-4D97-AF65-F5344CB8AC3E}">
+        <p14:creationId xmlns:p14="http://schemas.microsoft.com/office/powerpoint/2010/main" val="3307529958"/>
+      </p:ext>
+    </p:extLst>
+  </p:cSld>
+  <p:clrMapOvr>
+    <a:masterClrMapping/>
+  </p:clrMapOvr>
+</p:notes>
 </file>
 
 <file path=ppt/slideLayouts/slideLayout1.xml><?xml version="1.0" encoding="utf-8"?>
@@ -319,7 +768,7 @@
           <a:p>
             <a:fld id="{C485584D-7D79-4248-9986-4CA35242F944}" type="datetimeFigureOut">
               <a:rPr lang="en-US" smtClean="0"/>
-              <a:t>12/18/2021</a:t>
+              <a:t>12/19/2021</a:t>
             </a:fld>
             <a:endParaRPr lang="en-US"/>
           </a:p>
@@ -693,7 +1142,7 @@
           <a:p>
             <a:fld id="{C485584D-7D79-4248-9986-4CA35242F944}" type="datetimeFigureOut">
               <a:rPr lang="en-US" smtClean="0"/>
-              <a:t>12/18/2021</a:t>
+              <a:t>12/19/2021</a:t>
             </a:fld>
             <a:endParaRPr lang="en-US"/>
           </a:p>
@@ -903,7 +1352,7 @@
           <a:p>
             <a:fld id="{C485584D-7D79-4248-9986-4CA35242F944}" type="datetimeFigureOut">
               <a:rPr lang="en-US" smtClean="0"/>
-              <a:t>12/18/2021</a:t>
+              <a:t>12/19/2021</a:t>
             </a:fld>
             <a:endParaRPr lang="en-US"/>
           </a:p>
@@ -1102,7 +1551,7 @@
           <a:p>
             <a:fld id="{C485584D-7D79-4248-9986-4CA35242F944}" type="datetimeFigureOut">
               <a:rPr lang="en-US" smtClean="0"/>
-              <a:t>12/18/2021</a:t>
+              <a:t>12/19/2021</a:t>
             </a:fld>
             <a:endParaRPr lang="en-US"/>
           </a:p>
@@ -1215,7 +1664,7 @@
           <a:p>
             <a:fld id="{C485584D-7D79-4248-9986-4CA35242F944}" type="datetimeFigureOut">
               <a:rPr lang="en-US" smtClean="0"/>
-              <a:t>12/18/2021</a:t>
+              <a:t>12/19/2021</a:t>
             </a:fld>
             <a:endParaRPr lang="en-US"/>
           </a:p>
@@ -1951,7 +2400,7 @@
           <a:p>
             <a:fld id="{C485584D-7D79-4248-9986-4CA35242F944}" type="datetimeFigureOut">
               <a:rPr lang="en-US" smtClean="0"/>
-              <a:t>12/18/2021</a:t>
+              <a:t>12/19/2021</a:t>
             </a:fld>
             <a:endParaRPr lang="en-US"/>
           </a:p>
@@ -2367,7 +2816,7 @@
           <a:p>
             <a:fld id="{C485584D-7D79-4248-9986-4CA35242F944}" type="datetimeFigureOut">
               <a:rPr lang="en-US" smtClean="0"/>
-              <a:t>12/18/2021</a:t>
+              <a:t>12/19/2021</a:t>
             </a:fld>
             <a:endParaRPr lang="en-US"/>
           </a:p>
@@ -2508,7 +2957,7 @@
           <a:p>
             <a:fld id="{C485584D-7D79-4248-9986-4CA35242F944}" type="datetimeFigureOut">
               <a:rPr lang="en-US" smtClean="0"/>
-              <a:t>12/18/2021</a:t>
+              <a:t>12/19/2021</a:t>
             </a:fld>
             <a:endParaRPr lang="en-US"/>
           </a:p>
@@ -2621,7 +3070,7 @@
           <a:p>
             <a:fld id="{C485584D-7D79-4248-9986-4CA35242F944}" type="datetimeFigureOut">
               <a:rPr lang="en-US" smtClean="0"/>
-              <a:t>12/18/2021</a:t>
+              <a:t>12/19/2021</a:t>
             </a:fld>
             <a:endParaRPr lang="en-US"/>
           </a:p>
@@ -2934,7 +3383,7 @@
           <a:p>
             <a:fld id="{C485584D-7D79-4248-9986-4CA35242F944}" type="datetimeFigureOut">
               <a:rPr lang="en-US" smtClean="0"/>
-              <a:t>12/18/2021</a:t>
+              <a:t>12/19/2021</a:t>
             </a:fld>
             <a:endParaRPr lang="en-US"/>
           </a:p>
@@ -3226,7 +3675,7 @@
           <a:p>
             <a:fld id="{C485584D-7D79-4248-9986-4CA35242F944}" type="datetimeFigureOut">
               <a:rPr lang="en-US" smtClean="0"/>
-              <a:t>12/18/2021</a:t>
+              <a:t>12/19/2021</a:t>
             </a:fld>
             <a:endParaRPr lang="en-US"/>
           </a:p>
@@ -3510,7 +3959,7 @@
           <a:p>
             <a:fld id="{C485584D-7D79-4248-9986-4CA35242F944}" type="datetimeFigureOut">
               <a:rPr lang="en-US" smtClean="0"/>
-              <a:t>12/18/2021</a:t>
+              <a:t>12/19/2021</a:t>
             </a:fld>
             <a:endParaRPr lang="en-US"/>
           </a:p>
@@ -4609,8 +5058,8 @@
         </p:nvSpPr>
         <p:spPr>
           <a:xfrm>
-            <a:off x="1028700" y="1371601"/>
-            <a:ext cx="10134600" cy="4759644"/>
+            <a:off x="1028700" y="1510747"/>
+            <a:ext cx="10134600" cy="4620497"/>
           </a:xfrm>
         </p:spPr>
         <p:txBody>
@@ -4618,47 +5067,109 @@
           <a:lstStyle/>
           <a:p>
             <a:r>
-              <a:rPr lang="en-US" b="0" i="0" dirty="0">
+              <a:rPr lang="en-US" b="0" i="1" dirty="0">
                 <a:solidFill>
                   <a:srgbClr val="333333"/>
                 </a:solidFill>
                 <a:effectLst/>
                 <a:latin typeface="nyt-imperial"/>
               </a:rPr>
-              <a:t>Americans filed paperwork to start 4.3 million businesses last year, according to </a:t>
-            </a:r>
-            <a:r>
-              <a:rPr lang="en-US" b="0" i="0" dirty="0">
+              <a:t>“Americans filed paperwork to start 4.3 million businesses last year, according to </a:t>
+            </a:r>
+            <a:r>
+              <a:rPr lang="en-US" b="0" i="1" dirty="0">
                 <a:solidFill>
                   <a:srgbClr val="326891"/>
                 </a:solidFill>
                 <a:effectLst/>
                 <a:latin typeface="nyt-imperial"/>
-                <a:hlinkClick r:id="rId2"/>
+                <a:hlinkClick r:id="rId3"/>
               </a:rPr>
               <a:t>data from the Census Bureau</a:t>
             </a:r>
             <a:r>
-              <a:rPr lang="en-US" b="0" i="0" dirty="0">
+              <a:rPr lang="en-US" b="0" i="1" dirty="0">
                 <a:solidFill>
                   <a:srgbClr val="333333"/>
                 </a:solidFill>
                 <a:effectLst/>
                 <a:latin typeface="nyt-imperial"/>
               </a:rPr>
-              <a:t>, a 24 percent increase from the year before and by far the most in the decade and a half that the government has kept track. </a:t>
-            </a:r>
-            <a:r>
-              <a:rPr lang="en-US" b="0" i="0">
+              <a:t>, a 24 percent increase from the year before and by far the most in the decade and a half that the government has kept track. Applications are on a pace to be even higher this year.” – </a:t>
+            </a:r>
+            <a:r>
+              <a:rPr lang="en-US" sz="1400" b="0" i="1" dirty="0">
                 <a:solidFill>
                   <a:srgbClr val="333333"/>
                 </a:solidFill>
                 <a:effectLst/>
                 <a:latin typeface="nyt-imperial"/>
               </a:rPr>
-              <a:t>Applications are on a pace to be even higher this year.</a:t>
-            </a:r>
-            <a:endParaRPr lang="en-US" dirty="0"/>
+              <a:t>New York Times (</a:t>
+            </a:r>
+            <a:r>
+              <a:rPr lang="en-US" sz="1400" b="0" i="1" dirty="0">
+                <a:solidFill>
+                  <a:srgbClr val="333333"/>
+                </a:solidFill>
+                <a:effectLst/>
+                <a:latin typeface="nyt-imperial"/>
+                <a:hlinkClick r:id="rId4"/>
+              </a:rPr>
+              <a:t>https://www.nytimes.com/2021/08/19/business/startup-business-creation-pandemic.html</a:t>
+            </a:r>
+            <a:r>
+              <a:rPr lang="en-US" sz="1400" b="0" i="1" dirty="0">
+                <a:solidFill>
+                  <a:srgbClr val="333333"/>
+                </a:solidFill>
+                <a:effectLst/>
+                <a:latin typeface="nyt-imperial"/>
+              </a:rPr>
+              <a:t>)</a:t>
+            </a:r>
+          </a:p>
+          <a:p>
+            <a:endParaRPr lang="en-US" sz="1400" i="1" dirty="0">
+              <a:solidFill>
+                <a:srgbClr val="333333"/>
+              </a:solidFill>
+              <a:latin typeface="nyt-imperial"/>
+            </a:endParaRPr>
+          </a:p>
+          <a:p>
+            <a:r>
+              <a:rPr lang="en-US" dirty="0">
+                <a:latin typeface="nyt-imperial"/>
+              </a:rPr>
+              <a:t>In 2020, there were 12,753 new business applications submitted in Davidson County, up 18.48% from 2019. (</a:t>
+            </a:r>
+            <a:r>
+              <a:rPr lang="en-US" dirty="0">
+                <a:latin typeface="nyt-imperial"/>
+                <a:hlinkClick r:id="rId3"/>
+              </a:rPr>
+              <a:t>https://www.census.gov/econ/bfs/index.html</a:t>
+            </a:r>
+            <a:r>
+              <a:rPr lang="en-US" dirty="0">
+                <a:latin typeface="nyt-imperial"/>
+              </a:rPr>
+              <a:t>)</a:t>
+            </a:r>
+          </a:p>
+          <a:p>
+            <a:endParaRPr lang="en-US" dirty="0">
+              <a:latin typeface="nyt-imperial"/>
+            </a:endParaRPr>
+          </a:p>
+          <a:p>
+            <a:r>
+              <a:rPr lang="en-US" dirty="0">
+                <a:latin typeface="nyt-imperial"/>
+              </a:rPr>
+              <a:t>Black-owned businesses make up 7.9% of all businesses in Davidson County (https://overheardonconferencecalls.com/business/best-cities-for-black-owned-businesses/</a:t>
+            </a:r>
           </a:p>
         </p:txBody>
       </p:sp>
@@ -5031,8 +5542,13 @@
             </a:pPr>
             <a:r>
               <a:rPr lang="en-US" dirty="0"/>
-              <a:t>Performed a spatial join between the Census dataframe and the businesses dataframe to get only businesses in  </a:t>
-            </a:r>
+              <a:t>Performed a spatial join between the Census dataframe and the businesses dataframe to get only businesses within the tracks with a predominantly </a:t>
+            </a:r>
+            <a:r>
+              <a:rPr lang="en-US"/>
+              <a:t>black population.</a:t>
+            </a:r>
+            <a:endParaRPr lang="en-US" dirty="0"/>
           </a:p>
         </p:txBody>
       </p:sp>
@@ -5040,6 +5556,358 @@
     <p:extLst>
       <p:ext uri="{BB962C8B-B14F-4D97-AF65-F5344CB8AC3E}">
         <p14:creationId xmlns:p14="http://schemas.microsoft.com/office/powerpoint/2010/main" val="2277109138"/>
+      </p:ext>
+    </p:extLst>
+  </p:cSld>
+  <p:clrMapOvr>
+    <a:masterClrMapping/>
+  </p:clrMapOvr>
+</p:sld>
+</file>
+
+<file path=ppt/slides/slide5.xml><?xml version="1.0" encoding="utf-8"?>
+<p:sld xmlns:a="http://schemas.openxmlformats.org/drawingml/2006/main" xmlns:r="http://schemas.openxmlformats.org/officeDocument/2006/relationships" xmlns:p="http://schemas.openxmlformats.org/presentationml/2006/main">
+  <p:cSld>
+    <p:bg>
+      <p:bgPr>
+        <a:solidFill>
+          <a:schemeClr val="bg1"/>
+        </a:solidFill>
+        <a:effectLst/>
+      </p:bgPr>
+    </p:bg>
+    <p:spTree>
+      <p:nvGrpSpPr>
+        <p:cNvPr id="1" name=""/>
+        <p:cNvGrpSpPr/>
+        <p:nvPr/>
+      </p:nvGrpSpPr>
+      <p:grpSpPr>
+        <a:xfrm>
+          <a:off x="0" y="0"/>
+          <a:ext cx="0" cy="0"/>
+          <a:chOff x="0" y="0"/>
+          <a:chExt cx="0" cy="0"/>
+        </a:xfrm>
+      </p:grpSpPr>
+      <p:sp>
+        <p:nvSpPr>
+          <p:cNvPr id="10" name="Freeform: Shape 9">
+            <a:extLst>
+              <a:ext uri="{FF2B5EF4-FFF2-40B4-BE49-F238E27FC236}">
+                <a16:creationId xmlns:a16="http://schemas.microsoft.com/office/drawing/2014/main" id="{9EB54D17-3792-403D-9127-495845021D2B}"/>
+              </a:ext>
+              <a:ext uri="{C183D7F6-B498-43B3-948B-1728B52AA6E4}">
+                <adec:decorative xmlns:adec="http://schemas.microsoft.com/office/drawing/2017/decorative" val="1"/>
+              </a:ext>
+            </a:extLst>
+          </p:cNvPr>
+          <p:cNvSpPr>
+            <a:spLocks noGrp="1" noRot="1" noChangeAspect="1" noMove="1" noResize="1" noEditPoints="1" noAdjustHandles="1" noChangeArrowheads="1" noChangeShapeType="1" noTextEdit="1"/>
+          </p:cNvSpPr>
+          <p:nvPr>
+            <p:extLst>
+              <p:ext uri="{386F3935-93C4-4BCD-93E2-E3B085C9AB24}">
+                <p16:designElem xmlns:p16="http://schemas.microsoft.com/office/powerpoint/2015/main" val="1"/>
+              </p:ext>
+            </p:extLst>
+          </p:nvPr>
+        </p:nvSpPr>
+        <p:spPr>
+          <a:xfrm>
+            <a:off x="0" y="0"/>
+            <a:ext cx="12192000" cy="6858000"/>
+          </a:xfrm>
+          <a:custGeom>
+            <a:avLst/>
+            <a:gdLst>
+              <a:gd name="connsiteX0" fmla="*/ 160920 w 12192000"/>
+              <a:gd name="connsiteY0" fmla="*/ 157606 h 6858000"/>
+              <a:gd name="connsiteX1" fmla="*/ 160920 w 12192000"/>
+              <a:gd name="connsiteY1" fmla="*/ 6700394 h 6858000"/>
+              <a:gd name="connsiteX2" fmla="*/ 12031081 w 12192000"/>
+              <a:gd name="connsiteY2" fmla="*/ 6700394 h 6858000"/>
+              <a:gd name="connsiteX3" fmla="*/ 12031081 w 12192000"/>
+              <a:gd name="connsiteY3" fmla="*/ 157606 h 6858000"/>
+              <a:gd name="connsiteX4" fmla="*/ 0 w 12192000"/>
+              <a:gd name="connsiteY4" fmla="*/ 0 h 6858000"/>
+              <a:gd name="connsiteX5" fmla="*/ 12192000 w 12192000"/>
+              <a:gd name="connsiteY5" fmla="*/ 0 h 6858000"/>
+              <a:gd name="connsiteX6" fmla="*/ 12192000 w 12192000"/>
+              <a:gd name="connsiteY6" fmla="*/ 6858000 h 6858000"/>
+              <a:gd name="connsiteX7" fmla="*/ 0 w 12192000"/>
+              <a:gd name="connsiteY7" fmla="*/ 6858000 h 6858000"/>
+            </a:gdLst>
+            <a:ahLst/>
+            <a:cxnLst>
+              <a:cxn ang="0">
+                <a:pos x="connsiteX0" y="connsiteY0"/>
+              </a:cxn>
+              <a:cxn ang="0">
+                <a:pos x="connsiteX1" y="connsiteY1"/>
+              </a:cxn>
+              <a:cxn ang="0">
+                <a:pos x="connsiteX2" y="connsiteY2"/>
+              </a:cxn>
+              <a:cxn ang="0">
+                <a:pos x="connsiteX3" y="connsiteY3"/>
+              </a:cxn>
+              <a:cxn ang="0">
+                <a:pos x="connsiteX4" y="connsiteY4"/>
+              </a:cxn>
+              <a:cxn ang="0">
+                <a:pos x="connsiteX5" y="connsiteY5"/>
+              </a:cxn>
+              <a:cxn ang="0">
+                <a:pos x="connsiteX6" y="connsiteY6"/>
+              </a:cxn>
+              <a:cxn ang="0">
+                <a:pos x="connsiteX7" y="connsiteY7"/>
+              </a:cxn>
+            </a:cxnLst>
+            <a:rect l="l" t="t" r="r" b="b"/>
+            <a:pathLst>
+              <a:path w="12192000" h="6858000">
+                <a:moveTo>
+                  <a:pt x="160920" y="157606"/>
+                </a:moveTo>
+                <a:lnTo>
+                  <a:pt x="160920" y="6700394"/>
+                </a:lnTo>
+                <a:lnTo>
+                  <a:pt x="12031081" y="6700394"/>
+                </a:lnTo>
+                <a:lnTo>
+                  <a:pt x="12031081" y="157606"/>
+                </a:lnTo>
+                <a:close/>
+                <a:moveTo>
+                  <a:pt x="0" y="0"/>
+                </a:moveTo>
+                <a:lnTo>
+                  <a:pt x="12192000" y="0"/>
+                </a:lnTo>
+                <a:lnTo>
+                  <a:pt x="12192000" y="6858000"/>
+                </a:lnTo>
+                <a:lnTo>
+                  <a:pt x="0" y="6858000"/>
+                </a:lnTo>
+                <a:close/>
+              </a:path>
+            </a:pathLst>
+          </a:custGeom>
+          <a:solidFill>
+            <a:schemeClr val="bg2"/>
+          </a:solidFill>
+          <a:ln w="12700" cap="flat" cmpd="sng" algn="ctr">
+            <a:noFill/>
+            <a:prstDash val="solid"/>
+            <a:miter lim="800000"/>
+          </a:ln>
+          <a:effectLst/>
+        </p:spPr>
+        <p:style>
+          <a:lnRef idx="2">
+            <a:schemeClr val="accent1">
+              <a:shade val="50000"/>
+            </a:schemeClr>
+          </a:lnRef>
+          <a:fillRef idx="1">
+            <a:schemeClr val="accent1"/>
+          </a:fillRef>
+          <a:effectRef idx="0">
+            <a:schemeClr val="accent1"/>
+          </a:effectRef>
+          <a:fontRef idx="minor">
+            <a:schemeClr val="lt1"/>
+          </a:fontRef>
+        </p:style>
+        <p:txBody>
+          <a:bodyPr rtlCol="0" anchor="ctr"/>
+          <a:lstStyle/>
+          <a:p>
+            <a:pPr algn="ctr"/>
+            <a:endParaRPr lang="en-US" dirty="0"/>
+          </a:p>
+        </p:txBody>
+      </p:sp>
+      <p:sp useBgFill="1">
+        <p:nvSpPr>
+          <p:cNvPr id="12" name="Rectangle 11">
+            <a:extLst>
+              <a:ext uri="{FF2B5EF4-FFF2-40B4-BE49-F238E27FC236}">
+                <a16:creationId xmlns:a16="http://schemas.microsoft.com/office/drawing/2014/main" id="{05FB7726-C6A8-44D0-B179-A65DE454D836}"/>
+              </a:ext>
+              <a:ext uri="{C183D7F6-B498-43B3-948B-1728B52AA6E4}">
+                <adec:decorative xmlns:adec="http://schemas.microsoft.com/office/drawing/2017/decorative" val="1"/>
+              </a:ext>
+            </a:extLst>
+          </p:cNvPr>
+          <p:cNvSpPr>
+            <a:spLocks noGrp="1" noRot="1" noChangeAspect="1" noMove="1" noResize="1" noEditPoints="1" noAdjustHandles="1" noChangeArrowheads="1" noChangeShapeType="1" noTextEdit="1"/>
+          </p:cNvSpPr>
+          <p:nvPr>
+            <p:extLst>
+              <p:ext uri="{386F3935-93C4-4BCD-93E2-E3B085C9AB24}">
+                <p16:designElem xmlns:p16="http://schemas.microsoft.com/office/powerpoint/2015/main" val="1"/>
+              </p:ext>
+            </p:extLst>
+          </p:nvPr>
+        </p:nvSpPr>
+        <p:spPr>
+          <a:xfrm>
+            <a:off x="0" y="0"/>
+            <a:ext cx="12192000" cy="6858000"/>
+          </a:xfrm>
+          <a:prstGeom prst="rect">
+            <a:avLst/>
+          </a:prstGeom>
+          <a:ln w="12700" cap="flat" cmpd="sng" algn="ctr">
+            <a:noFill/>
+            <a:prstDash val="solid"/>
+            <a:miter lim="800000"/>
+          </a:ln>
+          <a:effectLst/>
+          <a:extLst>
+            <a:ext uri="{91240B29-F687-4F45-9708-019B960494DF}">
+              <a14:hiddenLine xmlns:a14="http://schemas.microsoft.com/office/drawing/2010/main" w="12700" cap="flat" cmpd="sng" algn="ctr">
+                <a:solidFill>
+                  <a:schemeClr val="accent1">
+                    <a:shade val="50000"/>
+                  </a:schemeClr>
+                </a:solidFill>
+                <a:prstDash val="solid"/>
+                <a:miter lim="800000"/>
+              </a14:hiddenLine>
+            </a:ext>
+          </a:extLst>
+        </p:spPr>
+        <p:style>
+          <a:lnRef idx="2">
+            <a:schemeClr val="accent1">
+              <a:shade val="50000"/>
+            </a:schemeClr>
+          </a:lnRef>
+          <a:fillRef idx="1">
+            <a:schemeClr val="accent1"/>
+          </a:fillRef>
+          <a:effectRef idx="0">
+            <a:schemeClr val="accent1"/>
+          </a:effectRef>
+          <a:fontRef idx="minor">
+            <a:schemeClr val="lt1"/>
+          </a:fontRef>
+        </p:style>
+        <p:txBody>
+          <a:bodyPr rtlCol="0" anchor="ctr"/>
+          <a:lstStyle/>
+          <a:p>
+            <a:pPr algn="ctr"/>
+            <a:endParaRPr lang="en-US" dirty="0"/>
+          </a:p>
+        </p:txBody>
+      </p:sp>
+      <p:pic>
+        <p:nvPicPr>
+          <p:cNvPr id="8" name="Picture 7" descr="Chart, bar chart&#10;&#10;Description automatically generated">
+            <a:extLst>
+              <a:ext uri="{FF2B5EF4-FFF2-40B4-BE49-F238E27FC236}">
+                <a16:creationId xmlns:a16="http://schemas.microsoft.com/office/drawing/2014/main" id="{EFD848AA-8765-4F48-BDAA-73AE0B9B12BD}"/>
+              </a:ext>
+            </a:extLst>
+          </p:cNvPr>
+          <p:cNvPicPr>
+            <a:picLocks noChangeAspect="1"/>
+          </p:cNvPicPr>
+          <p:nvPr/>
+        </p:nvPicPr>
+        <p:blipFill>
+          <a:blip r:embed="rId2">
+            <a:extLst>
+              <a:ext uri="{28A0092B-C50C-407E-A947-70E740481C1C}">
+                <a14:useLocalDpi xmlns:a14="http://schemas.microsoft.com/office/drawing/2010/main" val="0"/>
+              </a:ext>
+            </a:extLst>
+          </a:blip>
+          <a:stretch>
+            <a:fillRect/>
+          </a:stretch>
+        </p:blipFill>
+        <p:spPr>
+          <a:xfrm>
+            <a:off x="77421" y="589279"/>
+            <a:ext cx="12037158" cy="5679442"/>
+          </a:xfrm>
+          <a:prstGeom prst="rect">
+            <a:avLst/>
+          </a:prstGeom>
+        </p:spPr>
+      </p:pic>
+    </p:spTree>
+    <p:extLst>
+      <p:ext uri="{BB962C8B-B14F-4D97-AF65-F5344CB8AC3E}">
+        <p14:creationId xmlns:p14="http://schemas.microsoft.com/office/powerpoint/2010/main" val="2908708605"/>
+      </p:ext>
+    </p:extLst>
+  </p:cSld>
+  <p:clrMapOvr>
+    <a:masterClrMapping/>
+  </p:clrMapOvr>
+</p:sld>
+</file>
+
+<file path=ppt/slides/slide6.xml><?xml version="1.0" encoding="utf-8"?>
+<p:sld xmlns:a="http://schemas.openxmlformats.org/drawingml/2006/main" xmlns:r="http://schemas.openxmlformats.org/officeDocument/2006/relationships" xmlns:p="http://schemas.openxmlformats.org/presentationml/2006/main">
+  <p:cSld>
+    <p:spTree>
+      <p:nvGrpSpPr>
+        <p:cNvPr id="1" name=""/>
+        <p:cNvGrpSpPr/>
+        <p:nvPr/>
+      </p:nvGrpSpPr>
+      <p:grpSpPr>
+        <a:xfrm>
+          <a:off x="0" y="0"/>
+          <a:ext cx="0" cy="0"/>
+          <a:chOff x="0" y="0"/>
+          <a:chExt cx="0" cy="0"/>
+        </a:xfrm>
+      </p:grpSpPr>
+      <p:pic>
+        <p:nvPicPr>
+          <p:cNvPr id="5" name="Picture 4">
+            <a:extLst>
+              <a:ext uri="{FF2B5EF4-FFF2-40B4-BE49-F238E27FC236}">
+                <a16:creationId xmlns:a16="http://schemas.microsoft.com/office/drawing/2014/main" id="{AAD1003B-A9D8-4BAA-9F7C-D3FD8ED84299}"/>
+              </a:ext>
+            </a:extLst>
+          </p:cNvPr>
+          <p:cNvPicPr>
+            <a:picLocks noChangeAspect="1"/>
+          </p:cNvPicPr>
+          <p:nvPr/>
+        </p:nvPicPr>
+        <p:blipFill>
+          <a:blip r:embed="rId2"/>
+          <a:stretch>
+            <a:fillRect/>
+          </a:stretch>
+        </p:blipFill>
+        <p:spPr>
+          <a:xfrm>
+            <a:off x="876300" y="266700"/>
+            <a:ext cx="10439400" cy="6324600"/>
+          </a:xfrm>
+          <a:prstGeom prst="rect">
+            <a:avLst/>
+          </a:prstGeom>
+        </p:spPr>
+      </p:pic>
+    </p:spTree>
+    <p:extLst>
+      <p:ext uri="{BB962C8B-B14F-4D97-AF65-F5344CB8AC3E}">
+        <p14:creationId xmlns:p14="http://schemas.microsoft.com/office/powerpoint/2010/main" val="4179085369"/>
       </p:ext>
     </p:extLst>
   </p:cSld>
@@ -5248,4 +6116,299 @@
     </a:ext>
   </a:extLst>
 </a:theme>
+</file>
+
+<file path=ppt/theme/theme2.xml><?xml version="1.0" encoding="utf-8"?>
+<a:theme xmlns:a="http://schemas.openxmlformats.org/drawingml/2006/main" name="Office Theme">
+  <a:themeElements>
+    <a:clrScheme name="Office">
+      <a:dk1>
+        <a:sysClr val="windowText" lastClr="000000"/>
+      </a:dk1>
+      <a:lt1>
+        <a:sysClr val="window" lastClr="FFFFFF"/>
+      </a:lt1>
+      <a:dk2>
+        <a:srgbClr val="44546A"/>
+      </a:dk2>
+      <a:lt2>
+        <a:srgbClr val="E7E6E6"/>
+      </a:lt2>
+      <a:accent1>
+        <a:srgbClr val="4472C4"/>
+      </a:accent1>
+      <a:accent2>
+        <a:srgbClr val="ED7D31"/>
+      </a:accent2>
+      <a:accent3>
+        <a:srgbClr val="A5A5A5"/>
+      </a:accent3>
+      <a:accent4>
+        <a:srgbClr val="FFC000"/>
+      </a:accent4>
+      <a:accent5>
+        <a:srgbClr val="5B9BD5"/>
+      </a:accent5>
+      <a:accent6>
+        <a:srgbClr val="70AD47"/>
+      </a:accent6>
+      <a:hlink>
+        <a:srgbClr val="0563C1"/>
+      </a:hlink>
+      <a:folHlink>
+        <a:srgbClr val="954F72"/>
+      </a:folHlink>
+    </a:clrScheme>
+    <a:fontScheme name="Office">
+      <a:majorFont>
+        <a:latin typeface="Calibri Light" panose="020F0302020204030204"/>
+        <a:ea typeface=""/>
+        <a:cs typeface=""/>
+        <a:font script="Jpan" typeface="游ゴシック Light"/>
+        <a:font script="Hang" typeface="맑은 고딕"/>
+        <a:font script="Hans" typeface="等线 Light"/>
+        <a:font script="Hant" typeface="新細明體"/>
+        <a:font script="Arab" typeface="Times New Roman"/>
+        <a:font script="Hebr" typeface="Times New Roman"/>
+        <a:font script="Thai" typeface="Angsana New"/>
+        <a:font script="Ethi" typeface="Nyala"/>
+        <a:font script="Beng" typeface="Vrinda"/>
+        <a:font script="Gujr" typeface="Shruti"/>
+        <a:font script="Khmr" typeface="MoolBoran"/>
+        <a:font script="Knda" typeface="Tunga"/>
+        <a:font script="Guru" typeface="Raavi"/>
+        <a:font script="Cans" typeface="Euphemia"/>
+        <a:font script="Cher" typeface="Plantagenet Cherokee"/>
+        <a:font script="Yiii" typeface="Microsoft Yi Baiti"/>
+        <a:font script="Tibt" typeface="Microsoft Himalaya"/>
+        <a:font script="Thaa" typeface="MV Boli"/>
+        <a:font script="Deva" typeface="Mangal"/>
+        <a:font script="Telu" typeface="Gautami"/>
+        <a:font script="Taml" typeface="Latha"/>
+        <a:font script="Syrc" typeface="Estrangelo Edessa"/>
+        <a:font script="Orya" typeface="Kalinga"/>
+        <a:font script="Mlym" typeface="Kartika"/>
+        <a:font script="Laoo" typeface="DokChampa"/>
+        <a:font script="Sinh" typeface="Iskoola Pota"/>
+        <a:font script="Mong" typeface="Mongolian Baiti"/>
+        <a:font script="Viet" typeface="Times New Roman"/>
+        <a:font script="Uigh" typeface="Microsoft Uighur"/>
+        <a:font script="Geor" typeface="Sylfaen"/>
+        <a:font script="Armn" typeface="Arial"/>
+        <a:font script="Bugi" typeface="Leelawadee UI"/>
+        <a:font script="Bopo" typeface="Microsoft JhengHei"/>
+        <a:font script="Java" typeface="Javanese Text"/>
+        <a:font script="Lisu" typeface="Segoe UI"/>
+        <a:font script="Mymr" typeface="Myanmar Text"/>
+        <a:font script="Nkoo" typeface="Ebrima"/>
+        <a:font script="Olck" typeface="Nirmala UI"/>
+        <a:font script="Osma" typeface="Ebrima"/>
+        <a:font script="Phag" typeface="Phagspa"/>
+        <a:font script="Syrn" typeface="Estrangelo Edessa"/>
+        <a:font script="Syrj" typeface="Estrangelo Edessa"/>
+        <a:font script="Syre" typeface="Estrangelo Edessa"/>
+        <a:font script="Sora" typeface="Nirmala UI"/>
+        <a:font script="Tale" typeface="Microsoft Tai Le"/>
+        <a:font script="Talu" typeface="Microsoft New Tai Lue"/>
+        <a:font script="Tfng" typeface="Ebrima"/>
+      </a:majorFont>
+      <a:minorFont>
+        <a:latin typeface="Calibri" panose="020F0502020204030204"/>
+        <a:ea typeface=""/>
+        <a:cs typeface=""/>
+        <a:font script="Jpan" typeface="游ゴシック"/>
+        <a:font script="Hang" typeface="맑은 고딕"/>
+        <a:font script="Hans" typeface="等线"/>
+        <a:font script="Hant" typeface="新細明體"/>
+        <a:font script="Arab" typeface="Arial"/>
+        <a:font script="Hebr" typeface="Arial"/>
+        <a:font script="Thai" typeface="Cordia New"/>
+        <a:font script="Ethi" typeface="Nyala"/>
+        <a:font script="Beng" typeface="Vrinda"/>
+        <a:font script="Gujr" typeface="Shruti"/>
+        <a:font script="Khmr" typeface="DaunPenh"/>
+        <a:font script="Knda" typeface="Tunga"/>
+        <a:font script="Guru" typeface="Raavi"/>
+        <a:font script="Cans" typeface="Euphemia"/>
+        <a:font script="Cher" typeface="Plantagenet Cherokee"/>
+        <a:font script="Yiii" typeface="Microsoft Yi Baiti"/>
+        <a:font script="Tibt" typeface="Microsoft Himalaya"/>
+        <a:font script="Thaa" typeface="MV Boli"/>
+        <a:font script="Deva" typeface="Mangal"/>
+        <a:font script="Telu" typeface="Gautami"/>
+        <a:font script="Taml" typeface="Latha"/>
+        <a:font script="Syrc" typeface="Estrangelo Edessa"/>
+        <a:font script="Orya" typeface="Kalinga"/>
+        <a:font script="Mlym" typeface="Kartika"/>
+        <a:font script="Laoo" typeface="DokChampa"/>
+        <a:font script="Sinh" typeface="Iskoola Pota"/>
+        <a:font script="Mong" typeface="Mongolian Baiti"/>
+        <a:font script="Viet" typeface="Arial"/>
+        <a:font script="Uigh" typeface="Microsoft Uighur"/>
+        <a:font script="Geor" typeface="Sylfaen"/>
+        <a:font script="Armn" typeface="Arial"/>
+        <a:font script="Bugi" typeface="Leelawadee UI"/>
+        <a:font script="Bopo" typeface="Microsoft JhengHei"/>
+        <a:font script="Java" typeface="Javanese Text"/>
+        <a:font script="Lisu" typeface="Segoe UI"/>
+        <a:font script="Mymr" typeface="Myanmar Text"/>
+        <a:font script="Nkoo" typeface="Ebrima"/>
+        <a:font script="Olck" typeface="Nirmala UI"/>
+        <a:font script="Osma" typeface="Ebrima"/>
+        <a:font script="Phag" typeface="Phagspa"/>
+        <a:font script="Syrn" typeface="Estrangelo Edessa"/>
+        <a:font script="Syrj" typeface="Estrangelo Edessa"/>
+        <a:font script="Syre" typeface="Estrangelo Edessa"/>
+        <a:font script="Sora" typeface="Nirmala UI"/>
+        <a:font script="Tale" typeface="Microsoft Tai Le"/>
+        <a:font script="Talu" typeface="Microsoft New Tai Lue"/>
+        <a:font script="Tfng" typeface="Ebrima"/>
+      </a:minorFont>
+    </a:fontScheme>
+    <a:fmtScheme name="Office">
+      <a:fillStyleLst>
+        <a:solidFill>
+          <a:schemeClr val="phClr"/>
+        </a:solidFill>
+        <a:gradFill rotWithShape="1">
+          <a:gsLst>
+            <a:gs pos="0">
+              <a:schemeClr val="phClr">
+                <a:lumMod val="110000"/>
+                <a:satMod val="105000"/>
+                <a:tint val="67000"/>
+              </a:schemeClr>
+            </a:gs>
+            <a:gs pos="50000">
+              <a:schemeClr val="phClr">
+                <a:lumMod val="105000"/>
+                <a:satMod val="103000"/>
+                <a:tint val="73000"/>
+              </a:schemeClr>
+            </a:gs>
+            <a:gs pos="100000">
+              <a:schemeClr val="phClr">
+                <a:lumMod val="105000"/>
+                <a:satMod val="109000"/>
+                <a:tint val="81000"/>
+              </a:schemeClr>
+            </a:gs>
+          </a:gsLst>
+          <a:lin ang="5400000" scaled="0"/>
+        </a:gradFill>
+        <a:gradFill rotWithShape="1">
+          <a:gsLst>
+            <a:gs pos="0">
+              <a:schemeClr val="phClr">
+                <a:satMod val="103000"/>
+                <a:lumMod val="102000"/>
+                <a:tint val="94000"/>
+              </a:schemeClr>
+            </a:gs>
+            <a:gs pos="50000">
+              <a:schemeClr val="phClr">
+                <a:satMod val="110000"/>
+                <a:lumMod val="100000"/>
+                <a:shade val="100000"/>
+              </a:schemeClr>
+            </a:gs>
+            <a:gs pos="100000">
+              <a:schemeClr val="phClr">
+                <a:lumMod val="99000"/>
+                <a:satMod val="120000"/>
+                <a:shade val="78000"/>
+              </a:schemeClr>
+            </a:gs>
+          </a:gsLst>
+          <a:lin ang="5400000" scaled="0"/>
+        </a:gradFill>
+      </a:fillStyleLst>
+      <a:lnStyleLst>
+        <a:ln w="6350" cap="flat" cmpd="sng" algn="ctr">
+          <a:solidFill>
+            <a:schemeClr val="phClr"/>
+          </a:solidFill>
+          <a:prstDash val="solid"/>
+          <a:miter lim="800000"/>
+        </a:ln>
+        <a:ln w="12700" cap="flat" cmpd="sng" algn="ctr">
+          <a:solidFill>
+            <a:schemeClr val="phClr"/>
+          </a:solidFill>
+          <a:prstDash val="solid"/>
+          <a:miter lim="800000"/>
+        </a:ln>
+        <a:ln w="19050" cap="flat" cmpd="sng" algn="ctr">
+          <a:solidFill>
+            <a:schemeClr val="phClr"/>
+          </a:solidFill>
+          <a:prstDash val="solid"/>
+          <a:miter lim="800000"/>
+        </a:ln>
+      </a:lnStyleLst>
+      <a:effectStyleLst>
+        <a:effectStyle>
+          <a:effectLst/>
+        </a:effectStyle>
+        <a:effectStyle>
+          <a:effectLst/>
+        </a:effectStyle>
+        <a:effectStyle>
+          <a:effectLst>
+            <a:outerShdw blurRad="57150" dist="19050" dir="5400000" algn="ctr" rotWithShape="0">
+              <a:srgbClr val="000000">
+                <a:alpha val="63000"/>
+              </a:srgbClr>
+            </a:outerShdw>
+          </a:effectLst>
+        </a:effectStyle>
+      </a:effectStyleLst>
+      <a:bgFillStyleLst>
+        <a:solidFill>
+          <a:schemeClr val="phClr"/>
+        </a:solidFill>
+        <a:solidFill>
+          <a:schemeClr val="phClr">
+            <a:tint val="95000"/>
+            <a:satMod val="170000"/>
+          </a:schemeClr>
+        </a:solidFill>
+        <a:gradFill rotWithShape="1">
+          <a:gsLst>
+            <a:gs pos="0">
+              <a:schemeClr val="phClr">
+                <a:tint val="93000"/>
+                <a:satMod val="150000"/>
+                <a:shade val="98000"/>
+                <a:lumMod val="102000"/>
+              </a:schemeClr>
+            </a:gs>
+            <a:gs pos="50000">
+              <a:schemeClr val="phClr">
+                <a:tint val="98000"/>
+                <a:satMod val="130000"/>
+                <a:shade val="90000"/>
+                <a:lumMod val="103000"/>
+              </a:schemeClr>
+            </a:gs>
+            <a:gs pos="100000">
+              <a:schemeClr val="phClr">
+                <a:shade val="63000"/>
+                <a:satMod val="120000"/>
+              </a:schemeClr>
+            </a:gs>
+          </a:gsLst>
+          <a:lin ang="5400000" scaled="0"/>
+        </a:gradFill>
+      </a:bgFillStyleLst>
+    </a:fmtScheme>
+  </a:themeElements>
+  <a:objectDefaults/>
+  <a:extraClrSchemeLst/>
+  <a:extLst>
+    <a:ext uri="{05A4C25C-085E-4340-85A3-A5531E510DB2}">
+      <thm15:themeFamily xmlns:thm15="http://schemas.microsoft.com/office/thememl/2012/main" name="Office Theme" id="{62F939B6-93AF-4DB8-9C6B-D6C7DFDC589F}" vid="{4A3C46E8-61CC-4603-A589-7422A47A8E4A}"/>
+    </a:ext>
+  </a:extLst>
+</a:theme>
 </file>
</xml_diff>